<commit_message>
Added in a bank run figure.
</commit_message>
<xml_diff>
--- a/Nature/figures.pptx
+++ b/Nature/figures.pptx
@@ -7,7 +7,8 @@
   <p:sldIdLst>
     <p:sldId id="256" r:id="rId2"/>
     <p:sldId id="258" r:id="rId3"/>
-    <p:sldId id="257" r:id="rId4"/>
+    <p:sldId id="259" r:id="rId4"/>
+    <p:sldId id="257" r:id="rId5"/>
   </p:sldIdLst>
   <p:sldSz cx="9601200" cy="12801600" type="A3"/>
   <p:notesSz cx="6858000" cy="9144000"/>
@@ -245,7 +246,7 @@
           <a:p>
             <a:fld id="{9BF37CAF-DAD9-447A-84B9-D54918012BD3}" type="datetimeFigureOut">
               <a:rPr lang="en-US" smtClean="0"/>
-              <a:t>6/30/2015</a:t>
+              <a:t>7/1/2015</a:t>
             </a:fld>
             <a:endParaRPr lang="en-US"/>
           </a:p>
@@ -415,7 +416,7 @@
           <a:p>
             <a:fld id="{9BF37CAF-DAD9-447A-84B9-D54918012BD3}" type="datetimeFigureOut">
               <a:rPr lang="en-US" smtClean="0"/>
-              <a:t>6/30/2015</a:t>
+              <a:t>7/1/2015</a:t>
             </a:fld>
             <a:endParaRPr lang="en-US"/>
           </a:p>
@@ -595,7 +596,7 @@
           <a:p>
             <a:fld id="{9BF37CAF-DAD9-447A-84B9-D54918012BD3}" type="datetimeFigureOut">
               <a:rPr lang="en-US" smtClean="0"/>
-              <a:t>6/30/2015</a:t>
+              <a:t>7/1/2015</a:t>
             </a:fld>
             <a:endParaRPr lang="en-US"/>
           </a:p>
@@ -765,7 +766,7 @@
           <a:p>
             <a:fld id="{9BF37CAF-DAD9-447A-84B9-D54918012BD3}" type="datetimeFigureOut">
               <a:rPr lang="en-US" smtClean="0"/>
-              <a:t>6/30/2015</a:t>
+              <a:t>7/1/2015</a:t>
             </a:fld>
             <a:endParaRPr lang="en-US"/>
           </a:p>
@@ -1009,7 +1010,7 @@
           <a:p>
             <a:fld id="{9BF37CAF-DAD9-447A-84B9-D54918012BD3}" type="datetimeFigureOut">
               <a:rPr lang="en-US" smtClean="0"/>
-              <a:t>6/30/2015</a:t>
+              <a:t>7/1/2015</a:t>
             </a:fld>
             <a:endParaRPr lang="en-US"/>
           </a:p>
@@ -1241,7 +1242,7 @@
           <a:p>
             <a:fld id="{9BF37CAF-DAD9-447A-84B9-D54918012BD3}" type="datetimeFigureOut">
               <a:rPr lang="en-US" smtClean="0"/>
-              <a:t>6/30/2015</a:t>
+              <a:t>7/1/2015</a:t>
             </a:fld>
             <a:endParaRPr lang="en-US"/>
           </a:p>
@@ -1608,7 +1609,7 @@
           <a:p>
             <a:fld id="{9BF37CAF-DAD9-447A-84B9-D54918012BD3}" type="datetimeFigureOut">
               <a:rPr lang="en-US" smtClean="0"/>
-              <a:t>6/30/2015</a:t>
+              <a:t>7/1/2015</a:t>
             </a:fld>
             <a:endParaRPr lang="en-US"/>
           </a:p>
@@ -1726,7 +1727,7 @@
           <a:p>
             <a:fld id="{9BF37CAF-DAD9-447A-84B9-D54918012BD3}" type="datetimeFigureOut">
               <a:rPr lang="en-US" smtClean="0"/>
-              <a:t>6/30/2015</a:t>
+              <a:t>7/1/2015</a:t>
             </a:fld>
             <a:endParaRPr lang="en-US"/>
           </a:p>
@@ -1821,7 +1822,7 @@
           <a:p>
             <a:fld id="{9BF37CAF-DAD9-447A-84B9-D54918012BD3}" type="datetimeFigureOut">
               <a:rPr lang="en-US" smtClean="0"/>
-              <a:t>6/30/2015</a:t>
+              <a:t>7/1/2015</a:t>
             </a:fld>
             <a:endParaRPr lang="en-US"/>
           </a:p>
@@ -2098,7 +2099,7 @@
           <a:p>
             <a:fld id="{9BF37CAF-DAD9-447A-84B9-D54918012BD3}" type="datetimeFigureOut">
               <a:rPr lang="en-US" smtClean="0"/>
-              <a:t>6/30/2015</a:t>
+              <a:t>7/1/2015</a:t>
             </a:fld>
             <a:endParaRPr lang="en-US"/>
           </a:p>
@@ -2355,7 +2356,7 @@
           <a:p>
             <a:fld id="{9BF37CAF-DAD9-447A-84B9-D54918012BD3}" type="datetimeFigureOut">
               <a:rPr lang="en-US" smtClean="0"/>
-              <a:t>6/30/2015</a:t>
+              <a:t>7/1/2015</a:t>
             </a:fld>
             <a:endParaRPr lang="en-US"/>
           </a:p>
@@ -2568,7 +2569,7 @@
           <a:p>
             <a:fld id="{9BF37CAF-DAD9-447A-84B9-D54918012BD3}" type="datetimeFigureOut">
               <a:rPr lang="en-US" smtClean="0"/>
-              <a:t>6/30/2015</a:t>
+              <a:t>7/1/2015</a:t>
             </a:fld>
             <a:endParaRPr lang="en-US"/>
           </a:p>
@@ -5932,8 +5933,8 @@
             </p:txBody>
           </p:sp>
         </p:grpSp>
-        <mc:AlternateContent xmlns:mc="http://schemas.openxmlformats.org/markup-compatibility/2006">
-          <mc:Choice xmlns:a14="http://schemas.microsoft.com/office/drawing/2010/main" Requires="a14">
+        <mc:AlternateContent xmlns:mc="http://schemas.openxmlformats.org/markup-compatibility/2006" xmlns:a14="http://schemas.microsoft.com/office/drawing/2010/main">
+          <mc:Choice Requires="a14">
             <p:sp>
               <p:nvSpPr>
                 <p:cNvPr id="66" name="TextBox 65"/>
@@ -6032,7 +6033,7 @@
               </p:txBody>
             </p:sp>
           </mc:Choice>
-          <mc:Fallback>
+          <mc:Fallback xmlns="">
             <p:sp>
               <p:nvSpPr>
                 <p:cNvPr id="66" name="TextBox 65"/>
@@ -6083,7 +6084,7 @@
             <p:spPr>
               <a:xfrm>
                 <a:off x="694874" y="9794098"/>
-                <a:ext cx="8211452" cy="523220"/>
+                <a:ext cx="8211452" cy="738664"/>
               </a:xfrm>
               <a:prstGeom prst="rect">
                 <a:avLst/>
@@ -6101,7 +6102,35 @@
                     <a:latin typeface="Times New Roman" panose="02020603050405020304" pitchFamily="18" charset="0"/>
                     <a:cs typeface="Times New Roman" panose="02020603050405020304" pitchFamily="18" charset="0"/>
                   </a:rPr>
-                  <a:t>Figure 1: A multi-agent fire fighting scenario set up as a global game.  Each player's imperfect estimate of the task is represented by </a:t>
+                  <a:t>Figure 1: A multi-agent fire fighting scenario set up as a global </a:t>
+                </a:r>
+                <a:r>
+                  <a:rPr lang="en-US" sz="1400" dirty="0" smtClean="0">
+                    <a:latin typeface="Times New Roman" panose="02020603050405020304" pitchFamily="18" charset="0"/>
+                    <a:cs typeface="Times New Roman" panose="02020603050405020304" pitchFamily="18" charset="0"/>
+                  </a:rPr>
+                  <a:t>game with concurrent benefit.  </a:t>
+                </a:r>
+                <a:r>
+                  <a:rPr lang="en-US" sz="1400" dirty="0">
+                    <a:latin typeface="Times New Roman" panose="02020603050405020304" pitchFamily="18" charset="0"/>
+                    <a:cs typeface="Times New Roman" panose="02020603050405020304" pitchFamily="18" charset="0"/>
+                  </a:rPr>
+                  <a:t>Each player's imperfect estimate of the </a:t>
+                </a:r>
+                <a:r>
+                  <a:rPr lang="en-US" sz="1400" dirty="0" smtClean="0">
+                    <a:latin typeface="Times New Roman" panose="02020603050405020304" pitchFamily="18" charset="0"/>
+                    <a:cs typeface="Times New Roman" panose="02020603050405020304" pitchFamily="18" charset="0"/>
+                  </a:rPr>
+                  <a:t>magnitude of the fire is </a:t>
+                </a:r>
+                <a:r>
+                  <a:rPr lang="en-US" sz="1400" dirty="0">
+                    <a:latin typeface="Times New Roman" panose="02020603050405020304" pitchFamily="18" charset="0"/>
+                    <a:cs typeface="Times New Roman" panose="02020603050405020304" pitchFamily="18" charset="0"/>
+                  </a:rPr>
+                  <a:t>represented by </a:t>
                 </a:r>
                 <a14:m>
                   <m:oMath xmlns:m="http://schemas.openxmlformats.org/officeDocument/2006/math">
@@ -6137,28 +6166,21 @@
                     <a:latin typeface="Times New Roman" panose="02020603050405020304" pitchFamily="18" charset="0"/>
                     <a:cs typeface="Times New Roman" panose="02020603050405020304" pitchFamily="18" charset="0"/>
                   </a:rPr>
-                  <a:t>, a sum of the </a:t>
+                  <a:t>, </a:t>
                 </a:r>
                 <a:r>
                   <a:rPr lang="en-US" sz="1400" dirty="0" smtClean="0">
                     <a:latin typeface="Times New Roman" panose="02020603050405020304" pitchFamily="18" charset="0"/>
                     <a:cs typeface="Times New Roman" panose="02020603050405020304" pitchFamily="18" charset="0"/>
                   </a:rPr>
-                  <a:t>common </a:t>
+                  <a:t>comprising the </a:t>
                 </a:r>
                 <a:r>
                   <a:rPr lang="en-US" sz="1400" dirty="0" smtClean="0">
                     <a:latin typeface="Times New Roman" panose="02020603050405020304" pitchFamily="18" charset="0"/>
                     <a:cs typeface="Times New Roman" panose="02020603050405020304" pitchFamily="18" charset="0"/>
                   </a:rPr>
-                  <a:t>stimulus</a:t>
-                </a:r>
-                <a:r>
-                  <a:rPr lang="en-US" sz="1400" dirty="0" smtClean="0">
-                    <a:latin typeface="Times New Roman" panose="02020603050405020304" pitchFamily="18" charset="0"/>
-                    <a:cs typeface="Times New Roman" panose="02020603050405020304" pitchFamily="18" charset="0"/>
-                  </a:rPr>
-                  <a:t> </a:t>
+                  <a:t>common stimulus </a:t>
                 </a:r>
                 <a14:m>
                   <m:oMath xmlns:m="http://schemas.openxmlformats.org/officeDocument/2006/math">
@@ -6167,12 +6189,6 @@
                         <a:latin typeface="Cambria Math" panose="02040503050406030204" pitchFamily="18" charset="0"/>
                       </a:rPr>
                       <m:t>𝜏</m:t>
-                    </m:r>
-                    <m:r>
-                      <a:rPr lang="en-US" sz="1400" i="1">
-                        <a:latin typeface="Cambria Math" panose="02040503050406030204" pitchFamily="18" charset="0"/>
-                      </a:rPr>
-                      <m:t>,</m:t>
                     </m:r>
                   </m:oMath>
                 </a14:m>
@@ -6242,7 +6258,7 @@
             <p:spPr>
               <a:xfrm>
                 <a:off x="694874" y="9794098"/>
-                <a:ext cx="8211452" cy="523220"/>
+                <a:ext cx="8211452" cy="738664"/>
               </a:xfrm>
               <a:prstGeom prst="rect">
                 <a:avLst/>
@@ -6250,7 +6266,7 @@
               <a:blipFill rotWithShape="0">
                 <a:blip r:embed="rId11"/>
                 <a:stretch>
-                  <a:fillRect l="-223" t="-2353" b="-11765"/>
+                  <a:fillRect l="-223" t="-1653" b="-7438"/>
                 </a:stretch>
               </a:blipFill>
             </p:spPr>
@@ -6328,7 +6344,21 @@
                     <a:latin typeface="Times New Roman" panose="02020603050405020304" pitchFamily="18" charset="0"/>
                     <a:cs typeface="Times New Roman" panose="02020603050405020304" pitchFamily="18" charset="0"/>
                   </a:rPr>
-                  <a:t>Figure 2: An ant foraging scenario presented as a global game. Each ant decides whether or not to participate in the food collecting task based on a number of environmental cues such as the travel time (</a:t>
+                  <a:t>Figure 2: An ant foraging scenario presented as a global </a:t>
+                </a:r>
+                <a:r>
+                  <a:rPr lang="en-US" sz="1400" dirty="0" smtClean="0">
+                    <a:latin typeface="Times New Roman" panose="02020603050405020304" pitchFamily="18" charset="0"/>
+                    <a:cs typeface="Times New Roman" panose="02020603050405020304" pitchFamily="18" charset="0"/>
+                  </a:rPr>
+                  <a:t>game with concurrent benefit. </a:t>
+                </a:r>
+                <a:r>
+                  <a:rPr lang="en-US" sz="1400" dirty="0" smtClean="0">
+                    <a:latin typeface="Times New Roman" panose="02020603050405020304" pitchFamily="18" charset="0"/>
+                    <a:cs typeface="Times New Roman" panose="02020603050405020304" pitchFamily="18" charset="0"/>
+                  </a:rPr>
+                  <a:t>Each ant decides whether or not to participate in the food collecting task based on a number of environmental cues such as the travel time (</a:t>
                 </a:r>
                 <a14:m>
                   <m:oMath xmlns:m="http://schemas.openxmlformats.org/officeDocument/2006/math">
@@ -6500,7 +6530,7 @@
               <a:blipFill rotWithShape="0">
                 <a:blip r:embed="rId2"/>
                 <a:stretch>
-                  <a:fillRect l="-217" t="-1042" r="-290" b="-4167"/>
+                  <a:fillRect l="-217" t="-1042" r="-434" b="-4167"/>
                 </a:stretch>
               </a:blipFill>
             </p:spPr>
@@ -7769,8 +7799,8 @@
             </p:style>
           </p:cxnSp>
         </p:grpSp>
-        <mc:AlternateContent xmlns:mc="http://schemas.openxmlformats.org/markup-compatibility/2006">
-          <mc:Choice xmlns:a14="http://schemas.microsoft.com/office/drawing/2010/main" Requires="a14">
+        <mc:AlternateContent xmlns:mc="http://schemas.openxmlformats.org/markup-compatibility/2006" xmlns:a14="http://schemas.microsoft.com/office/drawing/2010/main">
+          <mc:Choice Requires="a14">
             <p:sp>
               <p:nvSpPr>
                 <p:cNvPr id="45" name="TextBox 44"/>
@@ -7793,6 +7823,7 @@
                 </a:bodyPr>
                 <a:lstStyle/>
                 <a:p>
+                  <a:pPr/>
                   <a14:m>
                     <m:oMathPara xmlns:m="http://schemas.openxmlformats.org/officeDocument/2006/math">
                       <m:oMathParaPr>
@@ -7832,7 +7863,7 @@
               </p:txBody>
             </p:sp>
           </mc:Choice>
-          <mc:Fallback>
+          <mc:Fallback xmlns="">
             <p:sp>
               <p:nvSpPr>
                 <p:cNvPr id="45" name="TextBox 44"/>
@@ -7871,8 +7902,8 @@
             </p:sp>
           </mc:Fallback>
         </mc:AlternateContent>
-        <mc:AlternateContent xmlns:mc="http://schemas.openxmlformats.org/markup-compatibility/2006">
-          <mc:Choice xmlns:a14="http://schemas.microsoft.com/office/drawing/2010/main" Requires="a14">
+        <mc:AlternateContent xmlns:mc="http://schemas.openxmlformats.org/markup-compatibility/2006" xmlns:a14="http://schemas.microsoft.com/office/drawing/2010/main">
+          <mc:Choice Requires="a14">
             <p:sp>
               <p:nvSpPr>
                 <p:cNvPr id="46" name="TextBox 45"/>
@@ -7895,6 +7926,7 @@
                 </a:bodyPr>
                 <a:lstStyle/>
                 <a:p>
+                  <a:pPr/>
                   <a14:m>
                     <m:oMathPara xmlns:m="http://schemas.openxmlformats.org/officeDocument/2006/math">
                       <m:oMathParaPr>
@@ -7934,7 +7966,7 @@
               </p:txBody>
             </p:sp>
           </mc:Choice>
-          <mc:Fallback>
+          <mc:Fallback xmlns="">
             <p:sp>
               <p:nvSpPr>
                 <p:cNvPr id="46" name="TextBox 45"/>
@@ -7973,8 +8005,8 @@
             </p:sp>
           </mc:Fallback>
         </mc:AlternateContent>
-        <mc:AlternateContent xmlns:mc="http://schemas.openxmlformats.org/markup-compatibility/2006">
-          <mc:Choice xmlns:a14="http://schemas.microsoft.com/office/drawing/2010/main" Requires="a14">
+        <mc:AlternateContent xmlns:mc="http://schemas.openxmlformats.org/markup-compatibility/2006" xmlns:a14="http://schemas.microsoft.com/office/drawing/2010/main">
+          <mc:Choice Requires="a14">
             <p:sp>
               <p:nvSpPr>
                 <p:cNvPr id="47" name="TextBox 46"/>
@@ -7997,6 +8029,7 @@
                 </a:bodyPr>
                 <a:lstStyle/>
                 <a:p>
+                  <a:pPr/>
                   <a14:m>
                     <m:oMathPara xmlns:m="http://schemas.openxmlformats.org/officeDocument/2006/math">
                       <m:oMathParaPr>
@@ -8017,7 +8050,7 @@
               </p:txBody>
             </p:sp>
           </mc:Choice>
-          <mc:Fallback>
+          <mc:Fallback xmlns="">
             <p:sp>
               <p:nvSpPr>
                 <p:cNvPr id="47" name="TextBox 46"/>
@@ -8056,8 +8089,8 @@
             </p:sp>
           </mc:Fallback>
         </mc:AlternateContent>
-        <mc:AlternateContent xmlns:mc="http://schemas.openxmlformats.org/markup-compatibility/2006">
-          <mc:Choice xmlns:a14="http://schemas.microsoft.com/office/drawing/2010/main" Requires="a14">
+        <mc:AlternateContent xmlns:mc="http://schemas.openxmlformats.org/markup-compatibility/2006" xmlns:a14="http://schemas.microsoft.com/office/drawing/2010/main">
+          <mc:Choice Requires="a14">
             <p:sp>
               <p:nvSpPr>
                 <p:cNvPr id="48" name="TextBox 47"/>
@@ -8203,7 +8236,7 @@
               </p:txBody>
             </p:sp>
           </mc:Choice>
-          <mc:Fallback>
+          <mc:Fallback xmlns="">
             <p:sp>
               <p:nvSpPr>
                 <p:cNvPr id="48" name="TextBox 47"/>
@@ -8242,8 +8275,8 @@
             </p:sp>
           </mc:Fallback>
         </mc:AlternateContent>
-        <mc:AlternateContent xmlns:mc="http://schemas.openxmlformats.org/markup-compatibility/2006">
-          <mc:Choice xmlns:a14="http://schemas.microsoft.com/office/drawing/2010/main" Requires="a14">
+        <mc:AlternateContent xmlns:mc="http://schemas.openxmlformats.org/markup-compatibility/2006" xmlns:a14="http://schemas.microsoft.com/office/drawing/2010/main">
+          <mc:Choice Requires="a14">
             <p:sp>
               <p:nvSpPr>
                 <p:cNvPr id="49" name="Cloud Callout 48"/>
@@ -8363,7 +8396,7 @@
               </p:txBody>
             </p:sp>
           </mc:Choice>
-          <mc:Fallback>
+          <mc:Fallback xmlns="">
             <p:sp>
               <p:nvSpPr>
                 <p:cNvPr id="49" name="Cloud Callout 48"/>
@@ -8610,6 +8643,1310 @@
           <a:chExt cx="0" cy="0"/>
         </a:xfrm>
       </p:grpSpPr>
+      <mc:AlternateContent xmlns:mc="http://schemas.openxmlformats.org/markup-compatibility/2006">
+        <mc:Choice xmlns:a14="http://schemas.microsoft.com/office/drawing/2010/main" Requires="a14">
+          <p:sp>
+            <p:nvSpPr>
+              <p:cNvPr id="1043" name="TextBox 1042"/>
+              <p:cNvSpPr txBox="1"/>
+              <p:nvPr/>
+            </p:nvSpPr>
+            <p:spPr>
+              <a:xfrm>
+                <a:off x="825417" y="7326634"/>
+                <a:ext cx="7871322" cy="1169551"/>
+              </a:xfrm>
+              <a:prstGeom prst="rect">
+                <a:avLst/>
+              </a:prstGeom>
+              <a:noFill/>
+            </p:spPr>
+            <p:txBody>
+              <a:bodyPr wrap="square" rtlCol="0">
+                <a:spAutoFit/>
+              </a:bodyPr>
+              <a:lstStyle/>
+              <a:p>
+                <a:r>
+                  <a:rPr lang="en-US" sz="1400" dirty="0" smtClean="0">
+                    <a:latin typeface="Times New Roman" panose="02020603050405020304" pitchFamily="18" charset="0"/>
+                    <a:cs typeface="Times New Roman" panose="02020603050405020304" pitchFamily="18" charset="0"/>
+                  </a:rPr>
+                  <a:t>Figure 3: A bank run scenario presented as a global game with concurrent benefit. As seen in Greece recently, a bank run can result from a complex combination of economic factors that are indirectly perceived by the populous as a common global signal </a:t>
+                </a:r>
+                <a14:m>
+                  <m:oMath xmlns:m="http://schemas.openxmlformats.org/officeDocument/2006/math">
+                    <m:r>
+                      <a:rPr lang="en-US" sz="1400" b="0" i="1" smtClean="0">
+                        <a:latin typeface="Cambria Math" panose="02040503050406030204" pitchFamily="18" charset="0"/>
+                        <a:cs typeface="Times New Roman" panose="02020603050405020304" pitchFamily="18" charset="0"/>
+                      </a:rPr>
+                      <m:t>𝜏</m:t>
+                    </m:r>
+                  </m:oMath>
+                </a14:m>
+                <a:r>
+                  <a:rPr lang="en-US" sz="1400" dirty="0" smtClean="0">
+                    <a:latin typeface="Times New Roman" panose="02020603050405020304" pitchFamily="18" charset="0"/>
+                    <a:cs typeface="Times New Roman" panose="02020603050405020304" pitchFamily="18" charset="0"/>
+                  </a:rPr>
+                  <a:t>. Each individual has a noisy (</a:t>
+                </a:r>
+                <a14:m>
+                  <m:oMath xmlns:m="http://schemas.openxmlformats.org/officeDocument/2006/math">
+                    <m:sSub>
+                      <m:sSubPr>
+                        <m:ctrlPr>
+                          <a:rPr lang="en-US" sz="1400" b="0" i="1" smtClean="0">
+                            <a:latin typeface="Cambria Math" panose="02040503050406030204" pitchFamily="18" charset="0"/>
+                            <a:cs typeface="Times New Roman" panose="02020603050405020304" pitchFamily="18" charset="0"/>
+                          </a:rPr>
+                        </m:ctrlPr>
+                      </m:sSubPr>
+                      <m:e>
+                        <m:r>
+                          <a:rPr lang="en-US" sz="1400" b="0" i="1" smtClean="0">
+                            <a:latin typeface="Cambria Math" panose="02040503050406030204" pitchFamily="18" charset="0"/>
+                            <a:cs typeface="Times New Roman" panose="02020603050405020304" pitchFamily="18" charset="0"/>
+                          </a:rPr>
+                          <m:t>𝜂</m:t>
+                        </m:r>
+                      </m:e>
+                      <m:sub>
+                        <m:r>
+                          <a:rPr lang="en-US" sz="1400" b="0" i="1" smtClean="0">
+                            <a:latin typeface="Cambria Math" panose="02040503050406030204" pitchFamily="18" charset="0"/>
+                            <a:cs typeface="Times New Roman" panose="02020603050405020304" pitchFamily="18" charset="0"/>
+                          </a:rPr>
+                          <m:t>𝑖</m:t>
+                        </m:r>
+                      </m:sub>
+                    </m:sSub>
+                  </m:oMath>
+                </a14:m>
+                <a:r>
+                  <a:rPr lang="en-US" sz="1400" dirty="0" smtClean="0">
+                    <a:latin typeface="Times New Roman" panose="02020603050405020304" pitchFamily="18" charset="0"/>
+                    <a:cs typeface="Times New Roman" panose="02020603050405020304" pitchFamily="18" charset="0"/>
+                  </a:rPr>
+                  <a:t>) mental estimate of </a:t>
+                </a:r>
+                <a14:m>
+                  <m:oMath xmlns:m="http://schemas.openxmlformats.org/officeDocument/2006/math">
+                    <m:r>
+                      <a:rPr lang="en-US" sz="1400" b="0" i="1" smtClean="0">
+                        <a:latin typeface="Cambria Math" panose="02040503050406030204" pitchFamily="18" charset="0"/>
+                        <a:cs typeface="Times New Roman" panose="02020603050405020304" pitchFamily="18" charset="0"/>
+                      </a:rPr>
+                      <m:t>𝜏</m:t>
+                    </m:r>
+                  </m:oMath>
+                </a14:m>
+                <a:r>
+                  <a:rPr lang="en-US" sz="1400" dirty="0" smtClean="0">
+                    <a:latin typeface="Times New Roman" panose="02020603050405020304" pitchFamily="18" charset="0"/>
+                    <a:cs typeface="Times New Roman" panose="02020603050405020304" pitchFamily="18" charset="0"/>
+                  </a:rPr>
+                  <a:t>, labeled </a:t>
+                </a:r>
+                <a14:m>
+                  <m:oMath xmlns:m="http://schemas.openxmlformats.org/officeDocument/2006/math">
+                    <m:sSub>
+                      <m:sSubPr>
+                        <m:ctrlPr>
+                          <a:rPr lang="en-US" sz="1400" b="0" i="1" smtClean="0">
+                            <a:latin typeface="Cambria Math" panose="02040503050406030204" pitchFamily="18" charset="0"/>
+                            <a:cs typeface="Times New Roman" panose="02020603050405020304" pitchFamily="18" charset="0"/>
+                          </a:rPr>
+                        </m:ctrlPr>
+                      </m:sSubPr>
+                      <m:e>
+                        <m:r>
+                          <a:rPr lang="en-US" sz="1400" b="0" i="1" smtClean="0">
+                            <a:latin typeface="Cambria Math" panose="02040503050406030204" pitchFamily="18" charset="0"/>
+                            <a:cs typeface="Times New Roman" panose="02020603050405020304" pitchFamily="18" charset="0"/>
+                          </a:rPr>
+                          <m:t>𝑥</m:t>
+                        </m:r>
+                      </m:e>
+                      <m:sub>
+                        <m:r>
+                          <a:rPr lang="en-US" sz="1400" b="0" i="1" smtClean="0">
+                            <a:latin typeface="Cambria Math" panose="02040503050406030204" pitchFamily="18" charset="0"/>
+                            <a:cs typeface="Times New Roman" panose="02020603050405020304" pitchFamily="18" charset="0"/>
+                          </a:rPr>
+                          <m:t>𝑖</m:t>
+                        </m:r>
+                      </m:sub>
+                    </m:sSub>
+                  </m:oMath>
+                </a14:m>
+                <a:r>
+                  <a:rPr lang="en-US" sz="1400" dirty="0" smtClean="0">
+                    <a:latin typeface="Times New Roman" panose="02020603050405020304" pitchFamily="18" charset="0"/>
+                    <a:cs typeface="Times New Roman" panose="02020603050405020304" pitchFamily="18" charset="0"/>
+                  </a:rPr>
+                  <a:t>, that represents their level of trust in the nation’s economy. If this level of trust crosses an individually set threshold for enough of the populous a bank run occurs.</a:t>
+                </a:r>
+                <a:endParaRPr lang="en-US" sz="1400" dirty="0">
+                  <a:latin typeface="Times New Roman" panose="02020603050405020304" pitchFamily="18" charset="0"/>
+                  <a:cs typeface="Times New Roman" panose="02020603050405020304" pitchFamily="18" charset="0"/>
+                </a:endParaRPr>
+              </a:p>
+            </p:txBody>
+          </p:sp>
+        </mc:Choice>
+        <mc:Fallback>
+          <p:sp>
+            <p:nvSpPr>
+              <p:cNvPr id="1043" name="TextBox 1042"/>
+              <p:cNvSpPr txBox="1">
+                <a:spLocks noRot="1" noChangeAspect="1" noMove="1" noResize="1" noEditPoints="1" noAdjustHandles="1" noChangeArrowheads="1" noChangeShapeType="1" noTextEdit="1"/>
+              </p:cNvSpPr>
+              <p:nvPr/>
+            </p:nvSpPr>
+            <p:spPr>
+              <a:xfrm>
+                <a:off x="825417" y="7326634"/>
+                <a:ext cx="7871322" cy="1169551"/>
+              </a:xfrm>
+              <a:prstGeom prst="rect">
+                <a:avLst/>
+              </a:prstGeom>
+              <a:blipFill rotWithShape="0">
+                <a:blip r:embed="rId2"/>
+                <a:stretch>
+                  <a:fillRect l="-232" t="-1042" r="-464" b="-4167"/>
+                </a:stretch>
+              </a:blipFill>
+            </p:spPr>
+            <p:txBody>
+              <a:bodyPr/>
+              <a:lstStyle/>
+              <a:p>
+                <a:r>
+                  <a:rPr lang="en-US">
+                    <a:noFill/>
+                  </a:rPr>
+                  <a:t> </a:t>
+                </a:r>
+              </a:p>
+            </p:txBody>
+          </p:sp>
+        </mc:Fallback>
+      </mc:AlternateContent>
+      <p:grpSp>
+        <p:nvGrpSpPr>
+          <p:cNvPr id="1044" name="Group 1043"/>
+          <p:cNvGrpSpPr/>
+          <p:nvPr/>
+        </p:nvGrpSpPr>
+        <p:grpSpPr>
+          <a:xfrm>
+            <a:off x="763478" y="437322"/>
+            <a:ext cx="7933261" cy="6611717"/>
+            <a:chOff x="763478" y="467139"/>
+            <a:chExt cx="7933261" cy="6611717"/>
+          </a:xfrm>
+        </p:grpSpPr>
+        <mc:AlternateContent xmlns:mc="http://schemas.openxmlformats.org/markup-compatibility/2006">
+          <mc:Choice xmlns:a14="http://schemas.microsoft.com/office/drawing/2010/main" Requires="a14">
+            <p:sp>
+              <p:nvSpPr>
+                <p:cNvPr id="87" name="Cloud Callout 86"/>
+                <p:cNvSpPr/>
+                <p:nvPr/>
+              </p:nvSpPr>
+              <p:spPr>
+                <a:xfrm>
+                  <a:off x="4517911" y="3263974"/>
+                  <a:ext cx="2755697" cy="980967"/>
+                </a:xfrm>
+                <a:prstGeom prst="cloudCallout">
+                  <a:avLst>
+                    <a:gd name="adj1" fmla="val -5068"/>
+                    <a:gd name="adj2" fmla="val 102965"/>
+                  </a:avLst>
+                </a:prstGeom>
+              </p:spPr>
+              <p:style>
+                <a:lnRef idx="2">
+                  <a:schemeClr val="dk1"/>
+                </a:lnRef>
+                <a:fillRef idx="1">
+                  <a:schemeClr val="lt1"/>
+                </a:fillRef>
+                <a:effectRef idx="0">
+                  <a:schemeClr val="dk1"/>
+                </a:effectRef>
+                <a:fontRef idx="minor">
+                  <a:schemeClr val="dk1"/>
+                </a:fontRef>
+              </p:style>
+              <p:txBody>
+                <a:bodyPr rtlCol="0" anchor="ctr"/>
+                <a:lstStyle/>
+                <a:p>
+                  <a:pPr algn="ctr"/>
+                  <a14:m>
+                    <m:oMathPara xmlns:m="http://schemas.openxmlformats.org/officeDocument/2006/math">
+                      <m:oMathParaPr>
+                        <m:jc m:val="centerGroup"/>
+                      </m:oMathParaPr>
+                      <m:oMath xmlns:m="http://schemas.openxmlformats.org/officeDocument/2006/math">
+                        <m:sSub>
+                          <m:sSubPr>
+                            <m:ctrlPr>
+                              <a:rPr lang="en-US" b="0" i="1" smtClean="0">
+                                <a:latin typeface="Cambria Math" panose="02040503050406030204" pitchFamily="18" charset="0"/>
+                              </a:rPr>
+                            </m:ctrlPr>
+                          </m:sSubPr>
+                          <m:e>
+                            <m:r>
+                              <a:rPr lang="en-US" b="0" i="1" smtClean="0">
+                                <a:latin typeface="Cambria Math" panose="02040503050406030204" pitchFamily="18" charset="0"/>
+                              </a:rPr>
+                              <m:t>𝑥</m:t>
+                            </m:r>
+                          </m:e>
+                          <m:sub>
+                            <m:r>
+                              <a:rPr lang="en-US" b="0" i="1" smtClean="0">
+                                <a:latin typeface="Cambria Math" panose="02040503050406030204" pitchFamily="18" charset="0"/>
+                              </a:rPr>
+                              <m:t>4</m:t>
+                            </m:r>
+                          </m:sub>
+                        </m:sSub>
+                        <m:r>
+                          <a:rPr lang="en-US" b="0" i="1" smtClean="0">
+                            <a:latin typeface="Cambria Math" panose="02040503050406030204" pitchFamily="18" charset="0"/>
+                          </a:rPr>
+                          <m:t>=</m:t>
+                        </m:r>
+                        <m:r>
+                          <a:rPr lang="en-US" b="0" i="1" smtClean="0">
+                            <a:latin typeface="Cambria Math" panose="02040503050406030204" pitchFamily="18" charset="0"/>
+                          </a:rPr>
+                          <m:t>𝜏</m:t>
+                        </m:r>
+                        <m:r>
+                          <a:rPr lang="en-US" b="0" i="1" smtClean="0">
+                            <a:latin typeface="Cambria Math" panose="02040503050406030204" pitchFamily="18" charset="0"/>
+                          </a:rPr>
+                          <m:t>+</m:t>
+                        </m:r>
+                        <m:sSub>
+                          <m:sSubPr>
+                            <m:ctrlPr>
+                              <a:rPr lang="en-US" b="0" i="1" smtClean="0">
+                                <a:latin typeface="Cambria Math" panose="02040503050406030204" pitchFamily="18" charset="0"/>
+                              </a:rPr>
+                            </m:ctrlPr>
+                          </m:sSubPr>
+                          <m:e>
+                            <m:r>
+                              <a:rPr lang="en-US" b="0" i="1" smtClean="0">
+                                <a:latin typeface="Cambria Math" panose="02040503050406030204" pitchFamily="18" charset="0"/>
+                              </a:rPr>
+                              <m:t>𝜂</m:t>
+                            </m:r>
+                          </m:e>
+                          <m:sub>
+                            <m:r>
+                              <a:rPr lang="en-US" b="0" i="1" smtClean="0">
+                                <a:latin typeface="Cambria Math" panose="02040503050406030204" pitchFamily="18" charset="0"/>
+                              </a:rPr>
+                              <m:t>4</m:t>
+                            </m:r>
+                          </m:sub>
+                        </m:sSub>
+                      </m:oMath>
+                    </m:oMathPara>
+                  </a14:m>
+                  <a:endParaRPr lang="en-US" dirty="0"/>
+                </a:p>
+              </p:txBody>
+            </p:sp>
+          </mc:Choice>
+          <mc:Fallback>
+            <p:sp>
+              <p:nvSpPr>
+                <p:cNvPr id="87" name="Cloud Callout 86"/>
+                <p:cNvSpPr>
+                  <a:spLocks noRot="1" noChangeAspect="1" noMove="1" noResize="1" noEditPoints="1" noAdjustHandles="1" noChangeArrowheads="1" noChangeShapeType="1" noTextEdit="1"/>
+                </p:cNvSpPr>
+                <p:nvPr/>
+              </p:nvSpPr>
+              <p:spPr>
+                <a:xfrm>
+                  <a:off x="4517911" y="3263974"/>
+                  <a:ext cx="2755697" cy="980967"/>
+                </a:xfrm>
+                <a:prstGeom prst="cloudCallout">
+                  <a:avLst>
+                    <a:gd name="adj1" fmla="val -5068"/>
+                    <a:gd name="adj2" fmla="val 102965"/>
+                  </a:avLst>
+                </a:prstGeom>
+                <a:blipFill rotWithShape="0">
+                  <a:blip r:embed="rId3"/>
+                  <a:stretch>
+                    <a:fillRect/>
+                  </a:stretch>
+                </a:blipFill>
+              </p:spPr>
+              <p:txBody>
+                <a:bodyPr/>
+                <a:lstStyle/>
+                <a:p>
+                  <a:r>
+                    <a:rPr lang="en-US">
+                      <a:noFill/>
+                    </a:rPr>
+                    <a:t> </a:t>
+                  </a:r>
+                </a:p>
+              </p:txBody>
+            </p:sp>
+          </mc:Fallback>
+        </mc:AlternateContent>
+        <p:grpSp>
+          <p:nvGrpSpPr>
+            <p:cNvPr id="6" name="Group 5"/>
+            <p:cNvGrpSpPr/>
+            <p:nvPr/>
+          </p:nvGrpSpPr>
+          <p:grpSpPr>
+            <a:xfrm>
+              <a:off x="825417" y="4859666"/>
+              <a:ext cx="7871322" cy="2219190"/>
+              <a:chOff x="105880" y="3963287"/>
+              <a:chExt cx="9564894" cy="3248026"/>
+            </a:xfrm>
+          </p:grpSpPr>
+          <p:pic>
+            <p:nvPicPr>
+              <p:cNvPr id="1038" name="Picture 14" descr="http://pixabay.com/static/uploads/photo/2014/03/24/17/07/crowd-295069_640.png"/>
+              <p:cNvPicPr>
+                <a:picLocks noChangeAspect="1" noChangeArrowheads="1"/>
+              </p:cNvPicPr>
+              <p:nvPr/>
+            </p:nvPicPr>
+            <p:blipFill>
+              <a:blip r:embed="rId4">
+                <a:extLst>
+                  <a:ext uri="{28A0092B-C50C-407E-A947-70E740481C1C}">
+                    <a14:useLocalDpi xmlns:a14="http://schemas.microsoft.com/office/drawing/2010/main" val="0"/>
+                  </a:ext>
+                </a:extLst>
+              </a:blip>
+              <a:srcRect/>
+              <a:stretch>
+                <a:fillRect/>
+              </a:stretch>
+            </p:blipFill>
+            <p:spPr bwMode="auto">
+              <a:xfrm>
+                <a:off x="105880" y="3963287"/>
+                <a:ext cx="6096000" cy="3248026"/>
+              </a:xfrm>
+              <a:prstGeom prst="rect">
+                <a:avLst/>
+              </a:prstGeom>
+              <a:noFill/>
+              <a:extLst>
+                <a:ext uri="{909E8E84-426E-40DD-AFC4-6F175D3DCCD1}">
+                  <a14:hiddenFill xmlns:a14="http://schemas.microsoft.com/office/drawing/2010/main">
+                    <a:solidFill>
+                      <a:srgbClr val="FFFFFF"/>
+                    </a:solidFill>
+                  </a14:hiddenFill>
+                </a:ext>
+              </a:extLst>
+            </p:spPr>
+          </p:pic>
+          <p:pic>
+            <p:nvPicPr>
+              <p:cNvPr id="14" name="Picture 14" descr="http://pixabay.com/static/uploads/photo/2014/03/24/17/07/crowd-295069_640.png"/>
+              <p:cNvPicPr>
+                <a:picLocks noChangeAspect="1" noChangeArrowheads="1"/>
+              </p:cNvPicPr>
+              <p:nvPr/>
+            </p:nvPicPr>
+            <p:blipFill>
+              <a:blip r:embed="rId4">
+                <a:extLst>
+                  <a:ext uri="{28A0092B-C50C-407E-A947-70E740481C1C}">
+                    <a14:useLocalDpi xmlns:a14="http://schemas.microsoft.com/office/drawing/2010/main" val="0"/>
+                  </a:ext>
+                </a:extLst>
+              </a:blip>
+              <a:srcRect/>
+              <a:stretch>
+                <a:fillRect/>
+              </a:stretch>
+            </p:blipFill>
+            <p:spPr bwMode="auto">
+              <a:xfrm>
+                <a:off x="3574774" y="3963287"/>
+                <a:ext cx="6096000" cy="3248026"/>
+              </a:xfrm>
+              <a:prstGeom prst="rect">
+                <a:avLst/>
+              </a:prstGeom>
+              <a:noFill/>
+              <a:extLst>
+                <a:ext uri="{909E8E84-426E-40DD-AFC4-6F175D3DCCD1}">
+                  <a14:hiddenFill xmlns:a14="http://schemas.microsoft.com/office/drawing/2010/main">
+                    <a:solidFill>
+                      <a:srgbClr val="FFFFFF"/>
+                    </a:solidFill>
+                  </a14:hiddenFill>
+                </a:ext>
+              </a:extLst>
+            </p:spPr>
+          </p:pic>
+        </p:grpSp>
+        <p:grpSp>
+          <p:nvGrpSpPr>
+            <p:cNvPr id="1029" name="Group 1028"/>
+            <p:cNvGrpSpPr/>
+            <p:nvPr/>
+          </p:nvGrpSpPr>
+          <p:grpSpPr>
+            <a:xfrm>
+              <a:off x="1094017" y="467139"/>
+              <a:ext cx="7334122" cy="2720723"/>
+              <a:chOff x="228600" y="298174"/>
+              <a:chExt cx="9243391" cy="3429000"/>
+            </a:xfrm>
+          </p:grpSpPr>
+          <p:sp>
+            <p:nvSpPr>
+              <p:cNvPr id="4" name="Rounded Rectangle 3"/>
+              <p:cNvSpPr/>
+              <p:nvPr/>
+            </p:nvSpPr>
+            <p:spPr>
+              <a:xfrm>
+                <a:off x="228600" y="298174"/>
+                <a:ext cx="9243391" cy="3429000"/>
+              </a:xfrm>
+              <a:prstGeom prst="roundRect">
+                <a:avLst/>
+              </a:prstGeom>
+            </p:spPr>
+            <p:style>
+              <a:lnRef idx="2">
+                <a:schemeClr val="dk1"/>
+              </a:lnRef>
+              <a:fillRef idx="1">
+                <a:schemeClr val="lt1"/>
+              </a:fillRef>
+              <a:effectRef idx="0">
+                <a:schemeClr val="dk1"/>
+              </a:effectRef>
+              <a:fontRef idx="minor">
+                <a:schemeClr val="dk1"/>
+              </a:fontRef>
+            </p:style>
+            <p:txBody>
+              <a:bodyPr rtlCol="0" anchor="ctr"/>
+              <a:lstStyle/>
+              <a:p>
+                <a:pPr algn="ctr"/>
+                <a:endParaRPr lang="en-US"/>
+              </a:p>
+            </p:txBody>
+          </p:sp>
+          <p:pic>
+            <p:nvPicPr>
+              <p:cNvPr id="1026" name="Picture 2" descr="https://pixabay.com/static/uploads/photo/2013/11/22/06/30/crash-215512_640.jpg"/>
+              <p:cNvPicPr>
+                <a:picLocks noChangeAspect="1" noChangeArrowheads="1"/>
+              </p:cNvPicPr>
+              <p:nvPr/>
+            </p:nvPicPr>
+            <p:blipFill rotWithShape="1">
+              <a:blip r:embed="rId5">
+                <a:clrChange>
+                  <a:clrFrom>
+                    <a:srgbClr val="FFFFFF"/>
+                  </a:clrFrom>
+                  <a:clrTo>
+                    <a:srgbClr val="FFFFFF">
+                      <a:alpha val="0"/>
+                    </a:srgbClr>
+                  </a:clrTo>
+                </a:clrChange>
+                <a:extLst>
+                  <a:ext uri="{28A0092B-C50C-407E-A947-70E740481C1C}">
+                    <a14:useLocalDpi xmlns:a14="http://schemas.microsoft.com/office/drawing/2010/main" val="0"/>
+                  </a:ext>
+                </a:extLst>
+              </a:blip>
+              <a:srcRect l="18644" t="5507" r="14835" b="10923"/>
+              <a:stretch/>
+            </p:blipFill>
+            <p:spPr bwMode="auto">
+              <a:xfrm>
+                <a:off x="2958411" y="534288"/>
+                <a:ext cx="2661714" cy="2361618"/>
+              </a:xfrm>
+              <a:prstGeom prst="rect">
+                <a:avLst/>
+              </a:prstGeom>
+              <a:noFill/>
+              <a:extLst>
+                <a:ext uri="{909E8E84-426E-40DD-AFC4-6F175D3DCCD1}">
+                  <a14:hiddenFill xmlns:a14="http://schemas.microsoft.com/office/drawing/2010/main">
+                    <a:solidFill>
+                      <a:srgbClr val="FFFFFF"/>
+                    </a:solidFill>
+                  </a14:hiddenFill>
+                </a:ext>
+              </a:extLst>
+            </p:spPr>
+          </p:pic>
+          <p:pic>
+            <p:nvPicPr>
+              <p:cNvPr id="1032" name="Picture 8" descr="http://upload.wikimedia.org/wikipedia/commons/5/51/Greek_debt_and_EU_average.png"/>
+              <p:cNvPicPr>
+                <a:picLocks noChangeAspect="1" noChangeArrowheads="1"/>
+              </p:cNvPicPr>
+              <p:nvPr/>
+            </p:nvPicPr>
+            <p:blipFill>
+              <a:blip r:embed="rId6" cstate="print">
+                <a:clrChange>
+                  <a:clrFrom>
+                    <a:srgbClr val="FFFFFF"/>
+                  </a:clrFrom>
+                  <a:clrTo>
+                    <a:srgbClr val="FFFFFF">
+                      <a:alpha val="0"/>
+                    </a:srgbClr>
+                  </a:clrTo>
+                </a:clrChange>
+                <a:extLst>
+                  <a:ext uri="{28A0092B-C50C-407E-A947-70E740481C1C}">
+                    <a14:useLocalDpi xmlns:a14="http://schemas.microsoft.com/office/drawing/2010/main" val="0"/>
+                  </a:ext>
+                </a:extLst>
+              </a:blip>
+              <a:srcRect/>
+              <a:stretch>
+                <a:fillRect/>
+              </a:stretch>
+            </p:blipFill>
+            <p:spPr bwMode="auto">
+              <a:xfrm>
+                <a:off x="228600" y="534287"/>
+                <a:ext cx="2665987" cy="2735687"/>
+              </a:xfrm>
+              <a:prstGeom prst="rect">
+                <a:avLst/>
+              </a:prstGeom>
+              <a:noFill/>
+              <a:extLst>
+                <a:ext uri="{909E8E84-426E-40DD-AFC4-6F175D3DCCD1}">
+                  <a14:hiddenFill xmlns:a14="http://schemas.microsoft.com/office/drawing/2010/main">
+                    <a:solidFill>
+                      <a:srgbClr val="FFFFFF"/>
+                    </a:solidFill>
+                  </a14:hiddenFill>
+                </a:ext>
+              </a:extLst>
+            </p:spPr>
+          </p:pic>
+          <p:pic>
+            <p:nvPicPr>
+              <p:cNvPr id="1034" name="Picture 10" descr="https://farm8.staticflickr.com/7303/15901454213_8576cf7456_o_d.jpg"/>
+              <p:cNvPicPr>
+                <a:picLocks noChangeAspect="1" noChangeArrowheads="1"/>
+              </p:cNvPicPr>
+              <p:nvPr/>
+            </p:nvPicPr>
+            <p:blipFill>
+              <a:blip r:embed="rId7">
+                <a:extLst>
+                  <a:ext uri="{28A0092B-C50C-407E-A947-70E740481C1C}">
+                    <a14:useLocalDpi xmlns:a14="http://schemas.microsoft.com/office/drawing/2010/main" val="0"/>
+                  </a:ext>
+                </a:extLst>
+              </a:blip>
+              <a:srcRect/>
+              <a:stretch>
+                <a:fillRect/>
+              </a:stretch>
+            </p:blipFill>
+            <p:spPr bwMode="auto">
+              <a:xfrm>
+                <a:off x="5874026" y="710465"/>
+                <a:ext cx="3190449" cy="2210081"/>
+              </a:xfrm>
+              <a:prstGeom prst="rect">
+                <a:avLst/>
+              </a:prstGeom>
+              <a:noFill/>
+              <a:extLst>
+                <a:ext uri="{909E8E84-426E-40DD-AFC4-6F175D3DCCD1}">
+                  <a14:hiddenFill xmlns:a14="http://schemas.microsoft.com/office/drawing/2010/main">
+                    <a:solidFill>
+                      <a:srgbClr val="FFFFFF"/>
+                    </a:solidFill>
+                  </a14:hiddenFill>
+                </a:ext>
+              </a:extLst>
+            </p:spPr>
+          </p:pic>
+          <mc:AlternateContent xmlns:mc="http://schemas.openxmlformats.org/markup-compatibility/2006">
+            <mc:Choice xmlns:a14="http://schemas.microsoft.com/office/drawing/2010/main" Requires="a14">
+              <p:sp>
+                <p:nvSpPr>
+                  <p:cNvPr id="49" name="TextBox 48"/>
+                  <p:cNvSpPr txBox="1"/>
+                  <p:nvPr/>
+                </p:nvSpPr>
+                <p:spPr>
+                  <a:xfrm>
+                    <a:off x="4289268" y="3046947"/>
+                    <a:ext cx="254557" cy="430887"/>
+                  </a:xfrm>
+                  <a:prstGeom prst="rect">
+                    <a:avLst/>
+                  </a:prstGeom>
+                  <a:noFill/>
+                </p:spPr>
+                <p:txBody>
+                  <a:bodyPr wrap="none" lIns="0" tIns="0" rIns="0" bIns="0" rtlCol="0">
+                    <a:spAutoFit/>
+                  </a:bodyPr>
+                  <a:lstStyle/>
+                  <a:p>
+                    <a14:m>
+                      <m:oMathPara xmlns:m="http://schemas.openxmlformats.org/officeDocument/2006/math">
+                        <m:oMathParaPr>
+                          <m:jc m:val="centerGroup"/>
+                        </m:oMathParaPr>
+                        <m:oMath xmlns:m="http://schemas.openxmlformats.org/officeDocument/2006/math">
+                          <m:r>
+                            <a:rPr lang="en-US" sz="2800" b="0" i="1" smtClean="0">
+                              <a:latin typeface="Cambria Math" panose="02040503050406030204" pitchFamily="18" charset="0"/>
+                            </a:rPr>
+                            <m:t>𝜏</m:t>
+                          </m:r>
+                        </m:oMath>
+                      </m:oMathPara>
+                    </a14:m>
+                    <a:endParaRPr lang="en-US" sz="2800" dirty="0"/>
+                  </a:p>
+                </p:txBody>
+              </p:sp>
+            </mc:Choice>
+            <mc:Fallback>
+              <p:sp>
+                <p:nvSpPr>
+                  <p:cNvPr id="49" name="TextBox 48"/>
+                  <p:cNvSpPr txBox="1">
+                    <a:spLocks noRot="1" noChangeAspect="1" noMove="1" noResize="1" noEditPoints="1" noAdjustHandles="1" noChangeArrowheads="1" noChangeShapeType="1" noTextEdit="1"/>
+                  </p:cNvSpPr>
+                  <p:nvPr/>
+                </p:nvSpPr>
+                <p:spPr>
+                  <a:xfrm>
+                    <a:off x="4289268" y="3046947"/>
+                    <a:ext cx="254557" cy="430887"/>
+                  </a:xfrm>
+                  <a:prstGeom prst="rect">
+                    <a:avLst/>
+                  </a:prstGeom>
+                  <a:blipFill rotWithShape="0">
+                    <a:blip r:embed="rId8"/>
+                    <a:stretch>
+                      <a:fillRect/>
+                    </a:stretch>
+                  </a:blipFill>
+                </p:spPr>
+                <p:txBody>
+                  <a:bodyPr/>
+                  <a:lstStyle/>
+                  <a:p>
+                    <a:r>
+                      <a:rPr lang="en-US">
+                        <a:noFill/>
+                      </a:rPr>
+                      <a:t> </a:t>
+                    </a:r>
+                  </a:p>
+                </p:txBody>
+              </p:sp>
+            </mc:Fallback>
+          </mc:AlternateContent>
+        </p:grpSp>
+        <p:sp>
+          <p:nvSpPr>
+            <p:cNvPr id="51" name="Cloud Callout 50"/>
+            <p:cNvSpPr/>
+            <p:nvPr/>
+          </p:nvSpPr>
+          <p:spPr>
+            <a:xfrm>
+              <a:off x="1997264" y="3529668"/>
+              <a:ext cx="2636483" cy="980967"/>
+            </a:xfrm>
+            <a:prstGeom prst="cloudCallout">
+              <a:avLst>
+                <a:gd name="adj1" fmla="val -17116"/>
+                <a:gd name="adj2" fmla="val 82701"/>
+              </a:avLst>
+            </a:prstGeom>
+          </p:spPr>
+          <p:style>
+            <a:lnRef idx="2">
+              <a:schemeClr val="dk1"/>
+            </a:lnRef>
+            <a:fillRef idx="1">
+              <a:schemeClr val="lt1"/>
+            </a:fillRef>
+            <a:effectRef idx="0">
+              <a:schemeClr val="dk1"/>
+            </a:effectRef>
+            <a:fontRef idx="minor">
+              <a:schemeClr val="dk1"/>
+            </a:fontRef>
+          </p:style>
+          <p:txBody>
+            <a:bodyPr rtlCol="0" anchor="ctr"/>
+            <a:lstStyle/>
+            <a:p>
+              <a:pPr algn="ctr"/>
+              <a:endParaRPr lang="en-US" dirty="0"/>
+            </a:p>
+          </p:txBody>
+        </p:sp>
+        <mc:AlternateContent xmlns:mc="http://schemas.openxmlformats.org/markup-compatibility/2006">
+          <mc:Choice xmlns:a14="http://schemas.microsoft.com/office/drawing/2010/main" Requires="a14">
+            <p:sp>
+              <p:nvSpPr>
+                <p:cNvPr id="84" name="Cloud Callout 83"/>
+                <p:cNvSpPr/>
+                <p:nvPr/>
+              </p:nvSpPr>
+              <p:spPr>
+                <a:xfrm>
+                  <a:off x="3153694" y="3601104"/>
+                  <a:ext cx="2728435" cy="980967"/>
+                </a:xfrm>
+                <a:prstGeom prst="cloudCallout">
+                  <a:avLst>
+                    <a:gd name="adj1" fmla="val 12653"/>
+                    <a:gd name="adj2" fmla="val 75609"/>
+                  </a:avLst>
+                </a:prstGeom>
+              </p:spPr>
+              <p:style>
+                <a:lnRef idx="2">
+                  <a:schemeClr val="dk1"/>
+                </a:lnRef>
+                <a:fillRef idx="1">
+                  <a:schemeClr val="lt1"/>
+                </a:fillRef>
+                <a:effectRef idx="0">
+                  <a:schemeClr val="dk1"/>
+                </a:effectRef>
+                <a:fontRef idx="minor">
+                  <a:schemeClr val="dk1"/>
+                </a:fontRef>
+              </p:style>
+              <p:txBody>
+                <a:bodyPr rtlCol="0" anchor="ctr"/>
+                <a:lstStyle/>
+                <a:p>
+                  <a:pPr algn="ctr"/>
+                  <a14:m>
+                    <m:oMathPara xmlns:m="http://schemas.openxmlformats.org/officeDocument/2006/math">
+                      <m:oMathParaPr>
+                        <m:jc m:val="centerGroup"/>
+                      </m:oMathParaPr>
+                      <m:oMath xmlns:m="http://schemas.openxmlformats.org/officeDocument/2006/math">
+                        <m:sSub>
+                          <m:sSubPr>
+                            <m:ctrlPr>
+                              <a:rPr lang="en-US" b="0" i="1" smtClean="0">
+                                <a:latin typeface="Cambria Math" panose="02040503050406030204" pitchFamily="18" charset="0"/>
+                              </a:rPr>
+                            </m:ctrlPr>
+                          </m:sSubPr>
+                          <m:e>
+                            <m:r>
+                              <a:rPr lang="en-US" b="0" i="1" smtClean="0">
+                                <a:latin typeface="Cambria Math" panose="02040503050406030204" pitchFamily="18" charset="0"/>
+                              </a:rPr>
+                              <m:t>𝑥</m:t>
+                            </m:r>
+                          </m:e>
+                          <m:sub>
+                            <m:r>
+                              <a:rPr lang="en-US" b="0" i="1" smtClean="0">
+                                <a:latin typeface="Cambria Math" panose="02040503050406030204" pitchFamily="18" charset="0"/>
+                              </a:rPr>
+                              <m:t>2</m:t>
+                            </m:r>
+                          </m:sub>
+                        </m:sSub>
+                        <m:r>
+                          <a:rPr lang="en-US" b="0" i="1" smtClean="0">
+                            <a:latin typeface="Cambria Math" panose="02040503050406030204" pitchFamily="18" charset="0"/>
+                          </a:rPr>
+                          <m:t>=</m:t>
+                        </m:r>
+                        <m:r>
+                          <a:rPr lang="en-US" b="0" i="1" smtClean="0">
+                            <a:latin typeface="Cambria Math" panose="02040503050406030204" pitchFamily="18" charset="0"/>
+                          </a:rPr>
+                          <m:t>𝜏</m:t>
+                        </m:r>
+                        <m:r>
+                          <a:rPr lang="en-US" b="0" i="1" smtClean="0">
+                            <a:latin typeface="Cambria Math" panose="02040503050406030204" pitchFamily="18" charset="0"/>
+                          </a:rPr>
+                          <m:t>+</m:t>
+                        </m:r>
+                        <m:sSub>
+                          <m:sSubPr>
+                            <m:ctrlPr>
+                              <a:rPr lang="en-US" b="0" i="1" smtClean="0">
+                                <a:latin typeface="Cambria Math" panose="02040503050406030204" pitchFamily="18" charset="0"/>
+                              </a:rPr>
+                            </m:ctrlPr>
+                          </m:sSubPr>
+                          <m:e>
+                            <m:r>
+                              <a:rPr lang="en-US" b="0" i="1" smtClean="0">
+                                <a:latin typeface="Cambria Math" panose="02040503050406030204" pitchFamily="18" charset="0"/>
+                              </a:rPr>
+                              <m:t>𝜂</m:t>
+                            </m:r>
+                          </m:e>
+                          <m:sub>
+                            <m:r>
+                              <a:rPr lang="en-US" b="0" i="1" smtClean="0">
+                                <a:latin typeface="Cambria Math" panose="02040503050406030204" pitchFamily="18" charset="0"/>
+                              </a:rPr>
+                              <m:t>2</m:t>
+                            </m:r>
+                          </m:sub>
+                        </m:sSub>
+                      </m:oMath>
+                    </m:oMathPara>
+                  </a14:m>
+                  <a:endParaRPr lang="en-US" dirty="0"/>
+                </a:p>
+              </p:txBody>
+            </p:sp>
+          </mc:Choice>
+          <mc:Fallback>
+            <p:sp>
+              <p:nvSpPr>
+                <p:cNvPr id="84" name="Cloud Callout 83"/>
+                <p:cNvSpPr>
+                  <a:spLocks noRot="1" noChangeAspect="1" noMove="1" noResize="1" noEditPoints="1" noAdjustHandles="1" noChangeArrowheads="1" noChangeShapeType="1" noTextEdit="1"/>
+                </p:cNvSpPr>
+                <p:nvPr/>
+              </p:nvSpPr>
+              <p:spPr>
+                <a:xfrm>
+                  <a:off x="3153694" y="3601104"/>
+                  <a:ext cx="2728435" cy="980967"/>
+                </a:xfrm>
+                <a:prstGeom prst="cloudCallout">
+                  <a:avLst>
+                    <a:gd name="adj1" fmla="val 12653"/>
+                    <a:gd name="adj2" fmla="val 75609"/>
+                  </a:avLst>
+                </a:prstGeom>
+                <a:blipFill rotWithShape="0">
+                  <a:blip r:embed="rId9"/>
+                  <a:stretch>
+                    <a:fillRect/>
+                  </a:stretch>
+                </a:blipFill>
+              </p:spPr>
+              <p:txBody>
+                <a:bodyPr/>
+                <a:lstStyle/>
+                <a:p>
+                  <a:r>
+                    <a:rPr lang="en-US">
+                      <a:noFill/>
+                    </a:rPr>
+                    <a:t> </a:t>
+                  </a:r>
+                </a:p>
+              </p:txBody>
+            </p:sp>
+          </mc:Fallback>
+        </mc:AlternateContent>
+        <mc:AlternateContent xmlns:mc="http://schemas.openxmlformats.org/markup-compatibility/2006">
+          <mc:Choice xmlns:a14="http://schemas.microsoft.com/office/drawing/2010/main" Requires="a14">
+            <p:sp>
+              <p:nvSpPr>
+                <p:cNvPr id="85" name="Cloud Callout 84"/>
+                <p:cNvSpPr/>
+                <p:nvPr/>
+              </p:nvSpPr>
+              <p:spPr>
+                <a:xfrm>
+                  <a:off x="763478" y="3690662"/>
+                  <a:ext cx="2713320" cy="980967"/>
+                </a:xfrm>
+                <a:prstGeom prst="cloudCallout">
+                  <a:avLst>
+                    <a:gd name="adj1" fmla="val -24894"/>
+                    <a:gd name="adj2" fmla="val 75609"/>
+                  </a:avLst>
+                </a:prstGeom>
+              </p:spPr>
+              <p:style>
+                <a:lnRef idx="2">
+                  <a:schemeClr val="dk1"/>
+                </a:lnRef>
+                <a:fillRef idx="1">
+                  <a:schemeClr val="lt1"/>
+                </a:fillRef>
+                <a:effectRef idx="0">
+                  <a:schemeClr val="dk1"/>
+                </a:effectRef>
+                <a:fontRef idx="minor">
+                  <a:schemeClr val="dk1"/>
+                </a:fontRef>
+              </p:style>
+              <p:txBody>
+                <a:bodyPr rtlCol="0" anchor="ctr"/>
+                <a:lstStyle/>
+                <a:p>
+                  <a:pPr algn="ctr"/>
+                  <a14:m>
+                    <m:oMathPara xmlns:m="http://schemas.openxmlformats.org/officeDocument/2006/math">
+                      <m:oMathParaPr>
+                        <m:jc m:val="centerGroup"/>
+                      </m:oMathParaPr>
+                      <m:oMath xmlns:m="http://schemas.openxmlformats.org/officeDocument/2006/math">
+                        <m:sSub>
+                          <m:sSubPr>
+                            <m:ctrlPr>
+                              <a:rPr lang="en-US" b="0" i="1" smtClean="0">
+                                <a:latin typeface="Cambria Math" panose="02040503050406030204" pitchFamily="18" charset="0"/>
+                              </a:rPr>
+                            </m:ctrlPr>
+                          </m:sSubPr>
+                          <m:e>
+                            <m:r>
+                              <a:rPr lang="en-US" b="0" i="1" smtClean="0">
+                                <a:latin typeface="Cambria Math" panose="02040503050406030204" pitchFamily="18" charset="0"/>
+                              </a:rPr>
+                              <m:t>𝑥</m:t>
+                            </m:r>
+                          </m:e>
+                          <m:sub>
+                            <m:r>
+                              <a:rPr lang="en-US" b="0" i="1" smtClean="0">
+                                <a:latin typeface="Cambria Math" panose="02040503050406030204" pitchFamily="18" charset="0"/>
+                              </a:rPr>
+                              <m:t>1</m:t>
+                            </m:r>
+                          </m:sub>
+                        </m:sSub>
+                        <m:r>
+                          <a:rPr lang="en-US" b="0" i="1" smtClean="0">
+                            <a:latin typeface="Cambria Math" panose="02040503050406030204" pitchFamily="18" charset="0"/>
+                          </a:rPr>
+                          <m:t>=</m:t>
+                        </m:r>
+                        <m:r>
+                          <a:rPr lang="en-US" b="0" i="1" smtClean="0">
+                            <a:latin typeface="Cambria Math" panose="02040503050406030204" pitchFamily="18" charset="0"/>
+                          </a:rPr>
+                          <m:t>𝜏</m:t>
+                        </m:r>
+                        <m:r>
+                          <a:rPr lang="en-US" b="0" i="1" smtClean="0">
+                            <a:latin typeface="Cambria Math" panose="02040503050406030204" pitchFamily="18" charset="0"/>
+                          </a:rPr>
+                          <m:t>+</m:t>
+                        </m:r>
+                        <m:sSub>
+                          <m:sSubPr>
+                            <m:ctrlPr>
+                              <a:rPr lang="en-US" b="0" i="1" smtClean="0">
+                                <a:latin typeface="Cambria Math" panose="02040503050406030204" pitchFamily="18" charset="0"/>
+                              </a:rPr>
+                            </m:ctrlPr>
+                          </m:sSubPr>
+                          <m:e>
+                            <m:r>
+                              <a:rPr lang="en-US" b="0" i="1" smtClean="0">
+                                <a:latin typeface="Cambria Math" panose="02040503050406030204" pitchFamily="18" charset="0"/>
+                              </a:rPr>
+                              <m:t>𝜂</m:t>
+                            </m:r>
+                          </m:e>
+                          <m:sub>
+                            <m:r>
+                              <a:rPr lang="en-US" b="0" i="1" smtClean="0">
+                                <a:latin typeface="Cambria Math" panose="02040503050406030204" pitchFamily="18" charset="0"/>
+                              </a:rPr>
+                              <m:t>1</m:t>
+                            </m:r>
+                          </m:sub>
+                        </m:sSub>
+                      </m:oMath>
+                    </m:oMathPara>
+                  </a14:m>
+                  <a:endParaRPr lang="en-US" dirty="0"/>
+                </a:p>
+              </p:txBody>
+            </p:sp>
+          </mc:Choice>
+          <mc:Fallback>
+            <p:sp>
+              <p:nvSpPr>
+                <p:cNvPr id="85" name="Cloud Callout 84"/>
+                <p:cNvSpPr>
+                  <a:spLocks noRot="1" noChangeAspect="1" noMove="1" noResize="1" noEditPoints="1" noAdjustHandles="1" noChangeArrowheads="1" noChangeShapeType="1" noTextEdit="1"/>
+                </p:cNvSpPr>
+                <p:nvPr/>
+              </p:nvSpPr>
+              <p:spPr>
+                <a:xfrm>
+                  <a:off x="763478" y="3690662"/>
+                  <a:ext cx="2713320" cy="980967"/>
+                </a:xfrm>
+                <a:prstGeom prst="cloudCallout">
+                  <a:avLst>
+                    <a:gd name="adj1" fmla="val -24894"/>
+                    <a:gd name="adj2" fmla="val 75609"/>
+                  </a:avLst>
+                </a:prstGeom>
+                <a:blipFill rotWithShape="0">
+                  <a:blip r:embed="rId10"/>
+                  <a:stretch>
+                    <a:fillRect/>
+                  </a:stretch>
+                </a:blipFill>
+              </p:spPr>
+              <p:txBody>
+                <a:bodyPr/>
+                <a:lstStyle/>
+                <a:p>
+                  <a:r>
+                    <a:rPr lang="en-US">
+                      <a:noFill/>
+                    </a:rPr>
+                    <a:t> </a:t>
+                  </a:r>
+                </a:p>
+              </p:txBody>
+            </p:sp>
+          </mc:Fallback>
+        </mc:AlternateContent>
+        <mc:AlternateContent xmlns:mc="http://schemas.openxmlformats.org/markup-compatibility/2006">
+          <mc:Choice xmlns:a14="http://schemas.microsoft.com/office/drawing/2010/main" Requires="a14">
+            <p:sp>
+              <p:nvSpPr>
+                <p:cNvPr id="86" name="Cloud Callout 85"/>
+                <p:cNvSpPr/>
+                <p:nvPr/>
+              </p:nvSpPr>
+              <p:spPr>
+                <a:xfrm>
+                  <a:off x="5685140" y="3645883"/>
+                  <a:ext cx="2728435" cy="980967"/>
+                </a:xfrm>
+                <a:prstGeom prst="cloudCallout">
+                  <a:avLst>
+                    <a:gd name="adj1" fmla="val 25381"/>
+                    <a:gd name="adj2" fmla="val 83715"/>
+                  </a:avLst>
+                </a:prstGeom>
+              </p:spPr>
+              <p:style>
+                <a:lnRef idx="2">
+                  <a:schemeClr val="dk1"/>
+                </a:lnRef>
+                <a:fillRef idx="1">
+                  <a:schemeClr val="lt1"/>
+                </a:fillRef>
+                <a:effectRef idx="0">
+                  <a:schemeClr val="dk1"/>
+                </a:effectRef>
+                <a:fontRef idx="minor">
+                  <a:schemeClr val="dk1"/>
+                </a:fontRef>
+              </p:style>
+              <p:txBody>
+                <a:bodyPr rtlCol="0" anchor="ctr"/>
+                <a:lstStyle/>
+                <a:p>
+                  <a:pPr algn="ctr"/>
+                  <a14:m>
+                    <m:oMathPara xmlns:m="http://schemas.openxmlformats.org/officeDocument/2006/math">
+                      <m:oMathParaPr>
+                        <m:jc m:val="centerGroup"/>
+                      </m:oMathParaPr>
+                      <m:oMath xmlns:m="http://schemas.openxmlformats.org/officeDocument/2006/math">
+                        <m:sSub>
+                          <m:sSubPr>
+                            <m:ctrlPr>
+                              <a:rPr lang="en-US" b="0" i="1" smtClean="0">
+                                <a:latin typeface="Cambria Math" panose="02040503050406030204" pitchFamily="18" charset="0"/>
+                              </a:rPr>
+                            </m:ctrlPr>
+                          </m:sSubPr>
+                          <m:e>
+                            <m:r>
+                              <a:rPr lang="en-US" b="0" i="1" smtClean="0">
+                                <a:latin typeface="Cambria Math" panose="02040503050406030204" pitchFamily="18" charset="0"/>
+                              </a:rPr>
+                              <m:t>𝑥</m:t>
+                            </m:r>
+                          </m:e>
+                          <m:sub>
+                            <m:r>
+                              <a:rPr lang="en-US" b="0" i="1" smtClean="0">
+                                <a:latin typeface="Cambria Math" panose="02040503050406030204" pitchFamily="18" charset="0"/>
+                              </a:rPr>
+                              <m:t>3</m:t>
+                            </m:r>
+                          </m:sub>
+                        </m:sSub>
+                        <m:r>
+                          <a:rPr lang="en-US" b="0" i="1" smtClean="0">
+                            <a:latin typeface="Cambria Math" panose="02040503050406030204" pitchFamily="18" charset="0"/>
+                          </a:rPr>
+                          <m:t>=</m:t>
+                        </m:r>
+                        <m:r>
+                          <a:rPr lang="en-US" b="0" i="1" smtClean="0">
+                            <a:latin typeface="Cambria Math" panose="02040503050406030204" pitchFamily="18" charset="0"/>
+                          </a:rPr>
+                          <m:t>𝜏</m:t>
+                        </m:r>
+                        <m:r>
+                          <a:rPr lang="en-US" b="0" i="1" smtClean="0">
+                            <a:latin typeface="Cambria Math" panose="02040503050406030204" pitchFamily="18" charset="0"/>
+                          </a:rPr>
+                          <m:t>+</m:t>
+                        </m:r>
+                        <m:sSub>
+                          <m:sSubPr>
+                            <m:ctrlPr>
+                              <a:rPr lang="en-US" b="0" i="1" smtClean="0">
+                                <a:latin typeface="Cambria Math" panose="02040503050406030204" pitchFamily="18" charset="0"/>
+                              </a:rPr>
+                            </m:ctrlPr>
+                          </m:sSubPr>
+                          <m:e>
+                            <m:r>
+                              <a:rPr lang="en-US" b="0" i="1" smtClean="0">
+                                <a:latin typeface="Cambria Math" panose="02040503050406030204" pitchFamily="18" charset="0"/>
+                              </a:rPr>
+                              <m:t>𝜂</m:t>
+                            </m:r>
+                          </m:e>
+                          <m:sub>
+                            <m:r>
+                              <a:rPr lang="en-US" b="0" i="1" smtClean="0">
+                                <a:latin typeface="Cambria Math" panose="02040503050406030204" pitchFamily="18" charset="0"/>
+                              </a:rPr>
+                              <m:t>3</m:t>
+                            </m:r>
+                          </m:sub>
+                        </m:sSub>
+                      </m:oMath>
+                    </m:oMathPara>
+                  </a14:m>
+                  <a:endParaRPr lang="en-US" dirty="0"/>
+                </a:p>
+              </p:txBody>
+            </p:sp>
+          </mc:Choice>
+          <mc:Fallback>
+            <p:sp>
+              <p:nvSpPr>
+                <p:cNvPr id="86" name="Cloud Callout 85"/>
+                <p:cNvSpPr>
+                  <a:spLocks noRot="1" noChangeAspect="1" noMove="1" noResize="1" noEditPoints="1" noAdjustHandles="1" noChangeArrowheads="1" noChangeShapeType="1" noTextEdit="1"/>
+                </p:cNvSpPr>
+                <p:nvPr/>
+              </p:nvSpPr>
+              <p:spPr>
+                <a:xfrm>
+                  <a:off x="5685140" y="3645883"/>
+                  <a:ext cx="2728435" cy="980967"/>
+                </a:xfrm>
+                <a:prstGeom prst="cloudCallout">
+                  <a:avLst>
+                    <a:gd name="adj1" fmla="val 25381"/>
+                    <a:gd name="adj2" fmla="val 83715"/>
+                  </a:avLst>
+                </a:prstGeom>
+                <a:blipFill rotWithShape="0">
+                  <a:blip r:embed="rId11"/>
+                  <a:stretch>
+                    <a:fillRect/>
+                  </a:stretch>
+                </a:blipFill>
+              </p:spPr>
+              <p:txBody>
+                <a:bodyPr/>
+                <a:lstStyle/>
+                <a:p>
+                  <a:r>
+                    <a:rPr lang="en-US">
+                      <a:noFill/>
+                    </a:rPr>
+                    <a:t> </a:t>
+                  </a:r>
+                </a:p>
+              </p:txBody>
+            </p:sp>
+          </mc:Fallback>
+        </mc:AlternateContent>
+      </p:grpSp>
+    </p:spTree>
+    <p:extLst>
+      <p:ext uri="{BB962C8B-B14F-4D97-AF65-F5344CB8AC3E}">
+        <p14:creationId xmlns:p14="http://schemas.microsoft.com/office/powerpoint/2010/main" val="1239017161"/>
+      </p:ext>
+    </p:extLst>
+  </p:cSld>
+  <p:clrMapOvr>
+    <a:masterClrMapping/>
+  </p:clrMapOvr>
+</p:sld>
+</file>
+
+<file path=ppt/slides/slide4.xml><?xml version="1.0" encoding="utf-8"?>
+<p:sld xmlns:a="http://schemas.openxmlformats.org/drawingml/2006/main" xmlns:r="http://schemas.openxmlformats.org/officeDocument/2006/relationships" xmlns:p="http://schemas.openxmlformats.org/presentationml/2006/main">
+  <p:cSld>
+    <p:spTree>
+      <p:nvGrpSpPr>
+        <p:cNvPr id="1" name=""/>
+        <p:cNvGrpSpPr/>
+        <p:nvPr/>
+      </p:nvGrpSpPr>
+      <p:grpSpPr>
+        <a:xfrm>
+          <a:off x="0" y="0"/>
+          <a:ext cx="0" cy="0"/>
+          <a:chOff x="0" y="0"/>
+          <a:chExt cx="0" cy="0"/>
+        </a:xfrm>
+      </p:grpSpPr>
       <p:pic>
         <p:nvPicPr>
           <p:cNvPr id="4" name="Picture 3"/>
@@ -8676,7 +10013,7 @@
                     <a:latin typeface="Times New Roman" panose="02020603050405020304" pitchFamily="18" charset="0"/>
                     <a:cs typeface="Times New Roman" panose="02020603050405020304" pitchFamily="18" charset="0"/>
                   </a:rPr>
-                  <a:t>3: </a:t>
+                  <a:t>4: </a:t>
                 </a:r>
                 <a:r>
                   <a:rPr lang="en-US" sz="1400" dirty="0" smtClean="0">

</xml_diff>